<commit_message>
intro + hdfs update
</commit_message>
<xml_diff>
--- a/Julian_Assignment1_10162016.pptx
+++ b/Julian_Assignment1_10162016.pptx
@@ -5,7 +5,7 @@
     <p:sldMasterId id="2147483660" r:id="rId1"/>
   </p:sldMasterIdLst>
   <p:notesMasterIdLst>
-    <p:notesMasterId r:id="rId17"/>
+    <p:notesMasterId r:id="rId18"/>
   </p:notesMasterIdLst>
   <p:sldIdLst>
     <p:sldId id="257" r:id="rId2"/>
@@ -20,9 +20,10 @@
     <p:sldId id="270" r:id="rId11"/>
     <p:sldId id="265" r:id="rId12"/>
     <p:sldId id="266" r:id="rId13"/>
-    <p:sldId id="267" r:id="rId14"/>
-    <p:sldId id="268" r:id="rId15"/>
-    <p:sldId id="272" r:id="rId16"/>
+    <p:sldId id="273" r:id="rId14"/>
+    <p:sldId id="267" r:id="rId15"/>
+    <p:sldId id="268" r:id="rId16"/>
+    <p:sldId id="272" r:id="rId17"/>
   </p:sldIdLst>
   <p:sldSz cx="12192000" cy="6858000"/>
   <p:notesSz cx="6858000" cy="9144000"/>
@@ -1527,6 +1528,138 @@
     <p:extLst>
       <p:ext uri="{BB962C8B-B14F-4D97-AF65-F5344CB8AC3E}">
         <p14:creationId xmlns:p14="http://schemas.microsoft.com/office/powerpoint/2010/main" val="2890728019"/>
+      </p:ext>
+    </p:extLst>
+  </p:cSld>
+  <p:clrMapOvr>
+    <a:masterClrMapping/>
+  </p:clrMapOvr>
+</p:notes>
+</file>
+
+<file path=ppt/notesSlides/notesSlide8.xml><?xml version="1.0" encoding="utf-8"?>
+<p:notes xmlns:a="http://schemas.openxmlformats.org/drawingml/2006/main" xmlns:r="http://schemas.openxmlformats.org/officeDocument/2006/relationships" xmlns:p="http://schemas.openxmlformats.org/presentationml/2006/main">
+  <p:cSld>
+    <p:spTree>
+      <p:nvGrpSpPr>
+        <p:cNvPr id="1" name=""/>
+        <p:cNvGrpSpPr/>
+        <p:nvPr/>
+      </p:nvGrpSpPr>
+      <p:grpSpPr>
+        <a:xfrm>
+          <a:off x="0" y="0"/>
+          <a:ext cx="0" cy="0"/>
+          <a:chOff x="0" y="0"/>
+          <a:chExt cx="0" cy="0"/>
+        </a:xfrm>
+      </p:grpSpPr>
+      <p:sp>
+        <p:nvSpPr>
+          <p:cNvPr id="2" name="Slide Image Placeholder 1"/>
+          <p:cNvSpPr>
+            <a:spLocks noGrp="1" noRot="1" noChangeAspect="1"/>
+          </p:cNvSpPr>
+          <p:nvPr>
+            <p:ph type="sldImg"/>
+          </p:nvPr>
+        </p:nvSpPr>
+        <p:spPr/>
+      </p:sp>
+      <p:sp>
+        <p:nvSpPr>
+          <p:cNvPr id="3" name="Notes Placeholder 2"/>
+          <p:cNvSpPr>
+            <a:spLocks noGrp="1"/>
+          </p:cNvSpPr>
+          <p:nvPr>
+            <p:ph type="body" idx="1"/>
+          </p:nvPr>
+        </p:nvSpPr>
+        <p:spPr/>
+        <p:txBody>
+          <a:bodyPr/>
+          <a:lstStyle/>
+          <a:p>
+            <a:r>
+              <a:rPr lang="en-CA" sz="1200" b="0" i="0" kern="1200">
+                <a:solidFill>
+                  <a:schemeClr val="tx1"/>
+                </a:solidFill>
+                <a:effectLst/>
+                <a:latin typeface="+mn-lt"/>
+                <a:ea typeface="+mn-ea"/>
+                <a:cs typeface="+mn-cs"/>
+              </a:rPr>
+              <a:t>Typically</a:t>
+            </a:r>
+            <a:r>
+              <a:rPr lang="en-CA" sz="1200" b="0" i="0" kern="1200" dirty="0">
+                <a:solidFill>
+                  <a:schemeClr val="tx1"/>
+                </a:solidFill>
+                <a:effectLst/>
+                <a:latin typeface="+mn-lt"/>
+                <a:ea typeface="+mn-ea"/>
+                <a:cs typeface="+mn-cs"/>
+              </a:rPr>
+              <a:t>, large HDFS clusters are arranged across multiple installations (racks). Network traffic between different nodes within the same installation is more efficient than network traffic across installations. A name node tries to place replicas of a block on multiple installations for improved fault tolerance. However, HDFS allows administrators to decide on which installation a node belongs. Therefore, each node knows its rack ID, making it </a:t>
+            </a:r>
+            <a:r>
+              <a:rPr lang="en-CA" sz="1200" b="0" i="1" kern="1200" dirty="0">
+                <a:solidFill>
+                  <a:schemeClr val="tx1"/>
+                </a:solidFill>
+                <a:effectLst/>
+                <a:latin typeface="+mn-lt"/>
+                <a:ea typeface="+mn-ea"/>
+                <a:cs typeface="+mn-cs"/>
+              </a:rPr>
+              <a:t>rack aware</a:t>
+            </a:r>
+            <a:r>
+              <a:rPr lang="en-CA" sz="1200" b="0" i="0" kern="1200" dirty="0">
+                <a:solidFill>
+                  <a:schemeClr val="tx1"/>
+                </a:solidFill>
+                <a:effectLst/>
+                <a:latin typeface="+mn-lt"/>
+                <a:ea typeface="+mn-ea"/>
+                <a:cs typeface="+mn-cs"/>
+              </a:rPr>
+              <a:t>.</a:t>
+            </a:r>
+            <a:endParaRPr lang="en-CA" dirty="0"/>
+          </a:p>
+        </p:txBody>
+      </p:sp>
+      <p:sp>
+        <p:nvSpPr>
+          <p:cNvPr id="4" name="Slide Number Placeholder 3"/>
+          <p:cNvSpPr>
+            <a:spLocks noGrp="1"/>
+          </p:cNvSpPr>
+          <p:nvPr>
+            <p:ph type="sldNum" sz="quarter" idx="10"/>
+          </p:nvPr>
+        </p:nvSpPr>
+        <p:spPr/>
+        <p:txBody>
+          <a:bodyPr/>
+          <a:lstStyle/>
+          <a:p>
+            <a:fld id="{12266E70-D995-4EE1-B5E0-38AF0F647902}" type="slidenum">
+              <a:rPr lang="en-CA" smtClean="0"/>
+              <a:t>13</a:t>
+            </a:fld>
+            <a:endParaRPr lang="en-CA"/>
+          </a:p>
+        </p:txBody>
+      </p:sp>
+    </p:spTree>
+    <p:extLst>
+      <p:ext uri="{BB962C8B-B14F-4D97-AF65-F5344CB8AC3E}">
+        <p14:creationId xmlns:p14="http://schemas.microsoft.com/office/powerpoint/2010/main" val="1230544895"/>
       </p:ext>
     </p:extLst>
   </p:cSld>
@@ -22988,13 +23121,8 @@
             </a:pPr>
             <a:r>
               <a:rPr lang="en-CA" dirty="0"/>
-              <a:t> The data blocks are distributed in data node system within the cluster and thus ensures the replica of data </a:t>
+              <a:t>By default, each block is 64MB.</a:t>
             </a:r>
-            <a:r>
-              <a:rPr lang="en-CA"/>
-              <a:t>is maintained.</a:t>
-            </a:r>
-            <a:endParaRPr lang="en-CA" dirty="0"/>
           </a:p>
           <a:p>
             <a:pPr>
@@ -23002,9 +23130,10 @@
               <a:buChar char="•"/>
             </a:pPr>
             <a:r>
-              <a:rPr lang="en-CA" dirty="0"/>
-              <a:t> By default, each block is 64MB.</a:t>
+              <a:rPr lang="en-US" dirty="0"/>
+              <a:t> The size can be increased to 128MB or bigger.</a:t>
             </a:r>
+            <a:endParaRPr lang="en-CA" dirty="0"/>
           </a:p>
         </p:txBody>
       </p:sp>
@@ -23070,6 +23199,157 @@
 </file>
 
 <file path=ppt/slides/slide13.xml><?xml version="1.0" encoding="utf-8"?>
+<p:sld xmlns:a="http://schemas.openxmlformats.org/drawingml/2006/main" xmlns:r="http://schemas.openxmlformats.org/officeDocument/2006/relationships" xmlns:p="http://schemas.openxmlformats.org/presentationml/2006/main">
+  <p:cSld>
+    <p:spTree>
+      <p:nvGrpSpPr>
+        <p:cNvPr id="1" name=""/>
+        <p:cNvGrpSpPr/>
+        <p:nvPr/>
+      </p:nvGrpSpPr>
+      <p:grpSpPr>
+        <a:xfrm>
+          <a:off x="0" y="0"/>
+          <a:ext cx="0" cy="0"/>
+          <a:chOff x="0" y="0"/>
+          <a:chExt cx="0" cy="0"/>
+        </a:xfrm>
+      </p:grpSpPr>
+      <p:pic>
+        <p:nvPicPr>
+          <p:cNvPr id="1026" name="Picture 2" descr="http://hadoop.apache.org/docs/r1.2.1/images/hdfsarchitecture.gif"/>
+          <p:cNvPicPr>
+            <a:picLocks noChangeAspect="1" noChangeArrowheads="1"/>
+          </p:cNvPicPr>
+          <p:nvPr/>
+        </p:nvPicPr>
+        <p:blipFill rotWithShape="1">
+          <a:blip r:embed="rId3">
+            <a:extLst>
+              <a:ext uri="{28A0092B-C50C-407E-A947-70E740481C1C}">
+                <a14:useLocalDpi xmlns:a14="http://schemas.microsoft.com/office/drawing/2010/main" val="0"/>
+              </a:ext>
+            </a:extLst>
+          </a:blip>
+          <a:srcRect/>
+          <a:stretch/>
+        </p:blipFill>
+        <p:spPr bwMode="auto">
+          <a:xfrm>
+            <a:off x="6096000" y="1543773"/>
+            <a:ext cx="5455921" cy="3770453"/>
+          </a:xfrm>
+          <a:prstGeom prst="rect">
+            <a:avLst/>
+          </a:prstGeom>
+          <a:noFill/>
+          <a:extLst>
+            <a:ext uri="{909E8E84-426E-40DD-AFC4-6F175D3DCCD1}">
+              <a14:hiddenFill xmlns:a14="http://schemas.microsoft.com/office/drawing/2010/main">
+                <a:solidFill>
+                  <a:srgbClr val="FFFFFF"/>
+                </a:solidFill>
+              </a14:hiddenFill>
+            </a:ext>
+          </a:extLst>
+        </p:spPr>
+      </p:pic>
+      <p:sp>
+        <p:nvSpPr>
+          <p:cNvPr id="2" name="Title 1"/>
+          <p:cNvSpPr>
+            <a:spLocks noGrp="1"/>
+          </p:cNvSpPr>
+          <p:nvPr>
+            <p:ph type="title"/>
+          </p:nvPr>
+        </p:nvSpPr>
+        <p:spPr>
+          <a:xfrm>
+            <a:off x="1024129" y="585216"/>
+            <a:ext cx="4431792" cy="1499616"/>
+          </a:xfrm>
+        </p:spPr>
+        <p:txBody>
+          <a:bodyPr>
+            <a:normAutofit/>
+          </a:bodyPr>
+          <a:lstStyle/>
+          <a:p>
+            <a:r>
+              <a:rPr lang="en-CA" dirty="0"/>
+              <a:t>Data block replication</a:t>
+            </a:r>
+          </a:p>
+        </p:txBody>
+      </p:sp>
+      <p:sp>
+        <p:nvSpPr>
+          <p:cNvPr id="3" name="Content Placeholder 2"/>
+          <p:cNvSpPr>
+            <a:spLocks noGrp="1"/>
+          </p:cNvSpPr>
+          <p:nvPr>
+            <p:ph idx="1"/>
+          </p:nvPr>
+        </p:nvSpPr>
+        <p:spPr>
+          <a:xfrm>
+            <a:off x="1024128" y="2286000"/>
+            <a:ext cx="4429615" cy="3931920"/>
+          </a:xfrm>
+        </p:spPr>
+        <p:txBody>
+          <a:bodyPr>
+            <a:normAutofit/>
+          </a:bodyPr>
+          <a:lstStyle/>
+          <a:p>
+            <a:pPr>
+              <a:buFont typeface="Arial" panose="020B0604020202020204" pitchFamily="34" charset="0"/>
+              <a:buChar char="•"/>
+            </a:pPr>
+            <a:r>
+              <a:rPr lang="en-CA" dirty="0"/>
+              <a:t> The data blocks are replicated for fault  tolerance.</a:t>
+            </a:r>
+          </a:p>
+          <a:p>
+            <a:pPr>
+              <a:buFont typeface="Arial" panose="020B0604020202020204" pitchFamily="34" charset="0"/>
+              <a:buChar char="•"/>
+            </a:pPr>
+            <a:r>
+              <a:rPr lang="en-CA" dirty="0"/>
+              <a:t>The data blocks are distributed in data node system within the cluster and thus ensures the replica of data is maintained.</a:t>
+            </a:r>
+          </a:p>
+          <a:p>
+            <a:pPr>
+              <a:buFont typeface="Arial" panose="020B0604020202020204" pitchFamily="34" charset="0"/>
+              <a:buChar char="•"/>
+            </a:pPr>
+            <a:r>
+              <a:rPr lang="en-CA" dirty="0"/>
+              <a:t>Rack-awareness.</a:t>
+            </a:r>
+          </a:p>
+        </p:txBody>
+      </p:sp>
+    </p:spTree>
+    <p:extLst>
+      <p:ext uri="{BB962C8B-B14F-4D97-AF65-F5344CB8AC3E}">
+        <p14:creationId xmlns:p14="http://schemas.microsoft.com/office/powerpoint/2010/main" val="1999701522"/>
+      </p:ext>
+    </p:extLst>
+  </p:cSld>
+  <p:clrMapOvr>
+    <a:masterClrMapping/>
+  </p:clrMapOvr>
+</p:sld>
+</file>
+
+<file path=ppt/slides/slide14.xml><?xml version="1.0" encoding="utf-8"?>
 <p:sld xmlns:a="http://schemas.openxmlformats.org/drawingml/2006/main" xmlns:r="http://schemas.openxmlformats.org/officeDocument/2006/relationships" xmlns:p="http://schemas.openxmlformats.org/presentationml/2006/main">
   <p:cSld>
     <p:spTree>
@@ -23181,7 +23461,7 @@
 </p:sld>
 </file>
 
-<file path=ppt/slides/slide14.xml><?xml version="1.0" encoding="utf-8"?>
+<file path=ppt/slides/slide15.xml><?xml version="1.0" encoding="utf-8"?>
 <p:sld xmlns:a="http://schemas.openxmlformats.org/drawingml/2006/main" xmlns:r="http://schemas.openxmlformats.org/officeDocument/2006/relationships" xmlns:p="http://schemas.openxmlformats.org/presentationml/2006/main">
   <p:cSld>
     <p:bg>
@@ -23432,7 +23712,7 @@
 </p:sld>
 </file>
 
-<file path=ppt/slides/slide15.xml><?xml version="1.0" encoding="utf-8"?>
+<file path=ppt/slides/slide16.xml><?xml version="1.0" encoding="utf-8"?>
 <p:sld xmlns:a="http://schemas.openxmlformats.org/drawingml/2006/main" xmlns:r="http://schemas.openxmlformats.org/officeDocument/2006/relationships" xmlns:p="http://schemas.openxmlformats.org/presentationml/2006/main">
   <p:cSld>
     <p:spTree>

</xml_diff>

<commit_message>
intro + hdfs, update
</commit_message>
<xml_diff>
--- a/Julian_Assignment1_10162016.pptx
+++ b/Julian_Assignment1_10162016.pptx
@@ -1582,18 +1582,6 @@
           <a:lstStyle/>
           <a:p>
             <a:r>
-              <a:rPr lang="en-CA" sz="1200" b="0" i="0" kern="1200">
-                <a:solidFill>
-                  <a:schemeClr val="tx1"/>
-                </a:solidFill>
-                <a:effectLst/>
-                <a:latin typeface="+mn-lt"/>
-                <a:ea typeface="+mn-ea"/>
-                <a:cs typeface="+mn-cs"/>
-              </a:rPr>
-              <a:t>Typically</a:t>
-            </a:r>
-            <a:r>
               <a:rPr lang="en-CA" sz="1200" b="0" i="0" kern="1200" dirty="0">
                 <a:solidFill>
                   <a:schemeClr val="tx1"/>
@@ -1603,7 +1591,7 @@
                 <a:ea typeface="+mn-ea"/>
                 <a:cs typeface="+mn-cs"/>
               </a:rPr>
-              <a:t>, large HDFS clusters are arranged across multiple installations (racks). Network traffic between different nodes within the same installation is more efficient than network traffic across installations. A name node tries to place replicas of a block on multiple installations for improved fault tolerance. However, HDFS allows administrators to decide on which installation a node belongs. Therefore, each node knows its rack ID, making it </a:t>
+              <a:t>Typically, large HDFS clusters are arranged across multiple installations (racks). Network traffic between different nodes within the same installation is more efficient than network traffic across installations. A name node tries to place replicas of a block on multiple installations for improved fault tolerance. However, HDFS allows administrators to decide on which installation a node belongs. Therefore, each node knows its rack ID, making it </a:t>
             </a:r>
             <a:r>
               <a:rPr lang="en-CA" sz="1200" b="0" i="1" kern="1200" dirty="0">
@@ -22701,7 +22689,7 @@
             </a:pPr>
             <a:r>
               <a:rPr lang="en-CA" dirty="0"/>
-              <a:t> Not a backup daemon for name node.</a:t>
+              <a:t> Not a backup daemon for name node. Can partially restore name node but can’t completely depend on it for disaster recovery.</a:t>
             </a:r>
           </a:p>
           <a:p>
@@ -23788,7 +23776,7 @@
             </a:pPr>
             <a:r>
               <a:rPr lang="en-CA" dirty="0"/>
-              <a:t> The back-up name node is in the same cluster.</a:t>
+              <a:t> The back-up name node (or checkpoint node) is in the same cluster.</a:t>
             </a:r>
           </a:p>
           <a:p>
@@ -23798,7 +23786,7 @@
             </a:pPr>
             <a:r>
               <a:rPr lang="en-CA" dirty="0"/>
-              <a:t> Each name node is configured as Active/Passive. Only one name node is in Active stat.</a:t>
+              <a:t> Each name node is configured as Active/Passive. Only one name node is in Active state.</a:t>
             </a:r>
           </a:p>
           <a:p>
@@ -24237,23 +24225,6 @@
                 </a:solidFill>
               </a:rPr>
               <a:t> Big data is a collection of large datasets that cannot be processed using traditional computing techniques. </a:t>
-            </a:r>
-          </a:p>
-          <a:p>
-            <a:pPr>
-              <a:buClr>
-                <a:schemeClr val="bg1"/>
-              </a:buClr>
-              <a:buFont typeface="Arial" panose="020B0604020202020204" pitchFamily="34" charset="0"/>
-              <a:buChar char="•"/>
-            </a:pPr>
-            <a:r>
-              <a:rPr lang="en-US" dirty="0">
-                <a:solidFill>
-                  <a:srgbClr val="FFFFFF"/>
-                </a:solidFill>
-              </a:rPr>
-              <a:t> It is not a single technique or a tool. It involves many areas of business and technology.</a:t>
             </a:r>
           </a:p>
           <a:p>
@@ -24973,12 +24944,51 @@
               <a:buNone/>
             </a:pPr>
             <a:r>
+              <a:rPr lang="en-CA" u="sng" dirty="0">
+                <a:solidFill>
+                  <a:srgbClr val="FFFFFF"/>
+                </a:solidFill>
+              </a:rPr>
+              <a:t>HDFS </a:t>
+            </a:r>
+            <a:r>
               <a:rPr lang="en-CA" dirty="0">
                 <a:solidFill>
                   <a:srgbClr val="FFFFFF"/>
                 </a:solidFill>
               </a:rPr>
-              <a:t>HDFS – distributed file system.</a:t>
+              <a:t>– distributed file system.</a:t>
+            </a:r>
+          </a:p>
+          <a:p>
+            <a:pPr marL="0" indent="0">
+              <a:buNone/>
+            </a:pPr>
+            <a:endParaRPr lang="en-CA" dirty="0">
+              <a:solidFill>
+                <a:srgbClr val="FFFFFF"/>
+              </a:solidFill>
+            </a:endParaRPr>
+          </a:p>
+          <a:p>
+            <a:pPr marL="0" indent="0">
+              <a:buNone/>
+            </a:pPr>
+            <a:r>
+              <a:rPr lang="en-CA" u="sng" dirty="0">
+                <a:solidFill>
+                  <a:srgbClr val="FFFFFF"/>
+                </a:solidFill>
+              </a:rPr>
+              <a:t>Map reduce </a:t>
+            </a:r>
+            <a:r>
+              <a:rPr lang="en-CA" dirty="0">
+                <a:solidFill>
+                  <a:srgbClr val="FFFFFF"/>
+                </a:solidFill>
+              </a:rPr>
+              <a:t>– offline computing engine.</a:t>
             </a:r>
           </a:p>
           <a:p>
@@ -25001,30 +25011,23 @@
                   <a:srgbClr val="FFFFFF"/>
                 </a:solidFill>
               </a:rPr>
-              <a:t>Map reduce – offline computing engine.</a:t>
+              <a:t>As versions updates, Hadoop is gaining more function modules such as </a:t>
             </a:r>
-          </a:p>
-          <a:p>
-            <a:pPr marL="0" indent="0">
-              <a:buNone/>
-            </a:pPr>
-            <a:endParaRPr lang="en-CA" dirty="0">
-              <a:solidFill>
-                <a:srgbClr val="FFFFFF"/>
-              </a:solidFill>
-            </a:endParaRPr>
-          </a:p>
-          <a:p>
-            <a:pPr marL="0" indent="0">
-              <a:buNone/>
-            </a:pPr>
+            <a:r>
+              <a:rPr lang="en-CA" u="sng" dirty="0">
+                <a:solidFill>
+                  <a:srgbClr val="FFFFFF"/>
+                </a:solidFill>
+              </a:rPr>
+              <a:t>Yarn</a:t>
+            </a:r>
             <a:r>
               <a:rPr lang="en-CA" dirty="0">
                 <a:solidFill>
                   <a:srgbClr val="FFFFFF"/>
                 </a:solidFill>
               </a:rPr>
-              <a:t>As versions updates, Hadoop is gaining more function modules such as Yarn which improves the performance of Hadoop.</a:t>
+              <a:t> which improves the performance of Hadoop.</a:t>
             </a:r>
           </a:p>
         </p:txBody>

</xml_diff>